<commit_message>
Upload most up to date power point
</commit_message>
<xml_diff>
--- a/talks/david-18-may-2014/https.pptx
+++ b/talks/david-18-may-2014/https.pptx
@@ -213,7 +213,7 @@
           <a:p>
             <a:fld id="{F95473D6-70D8-024B-B344-BD90F370CE13}" type="datetimeFigureOut">
               <a:rPr lang="en-US" smtClean="0"/>
-              <a:t>5/18/14</a:t>
+              <a:t>5/19/14</a:t>
             </a:fld>
             <a:endParaRPr lang="en-US"/>
           </a:p>
@@ -1158,7 +1158,7 @@
           <a:p>
             <a:fld id="{27355D62-5D94-8B4F-9374-AA8F8E83C52E}" type="datetimeFigureOut">
               <a:rPr lang="en-US" smtClean="0"/>
-              <a:t>5/18/14</a:t>
+              <a:t>5/19/14</a:t>
             </a:fld>
             <a:endParaRPr lang="en-US"/>
           </a:p>
@@ -1328,7 +1328,7 @@
           <a:p>
             <a:fld id="{27355D62-5D94-8B4F-9374-AA8F8E83C52E}" type="datetimeFigureOut">
               <a:rPr lang="en-US" smtClean="0"/>
-              <a:t>5/18/14</a:t>
+              <a:t>5/19/14</a:t>
             </a:fld>
             <a:endParaRPr lang="en-US"/>
           </a:p>
@@ -1508,7 +1508,7 @@
           <a:p>
             <a:fld id="{27355D62-5D94-8B4F-9374-AA8F8E83C52E}" type="datetimeFigureOut">
               <a:rPr lang="en-US" smtClean="0"/>
-              <a:t>5/18/14</a:t>
+              <a:t>5/19/14</a:t>
             </a:fld>
             <a:endParaRPr lang="en-US"/>
           </a:p>
@@ -1678,7 +1678,7 @@
           <a:p>
             <a:fld id="{27355D62-5D94-8B4F-9374-AA8F8E83C52E}" type="datetimeFigureOut">
               <a:rPr lang="en-US" smtClean="0"/>
-              <a:t>5/18/14</a:t>
+              <a:t>5/19/14</a:t>
             </a:fld>
             <a:endParaRPr lang="en-US"/>
           </a:p>
@@ -1924,7 +1924,7 @@
           <a:p>
             <a:fld id="{27355D62-5D94-8B4F-9374-AA8F8E83C52E}" type="datetimeFigureOut">
               <a:rPr lang="en-US" smtClean="0"/>
-              <a:t>5/18/14</a:t>
+              <a:t>5/19/14</a:t>
             </a:fld>
             <a:endParaRPr lang="en-US"/>
           </a:p>
@@ -2212,7 +2212,7 @@
           <a:p>
             <a:fld id="{27355D62-5D94-8B4F-9374-AA8F8E83C52E}" type="datetimeFigureOut">
               <a:rPr lang="en-US" smtClean="0"/>
-              <a:t>5/18/14</a:t>
+              <a:t>5/19/14</a:t>
             </a:fld>
             <a:endParaRPr lang="en-US"/>
           </a:p>
@@ -2634,7 +2634,7 @@
           <a:p>
             <a:fld id="{27355D62-5D94-8B4F-9374-AA8F8E83C52E}" type="datetimeFigureOut">
               <a:rPr lang="en-US" smtClean="0"/>
-              <a:t>5/18/14</a:t>
+              <a:t>5/19/14</a:t>
             </a:fld>
             <a:endParaRPr lang="en-US"/>
           </a:p>
@@ -2752,7 +2752,7 @@
           <a:p>
             <a:fld id="{27355D62-5D94-8B4F-9374-AA8F8E83C52E}" type="datetimeFigureOut">
               <a:rPr lang="en-US" smtClean="0"/>
-              <a:t>5/18/14</a:t>
+              <a:t>5/19/14</a:t>
             </a:fld>
             <a:endParaRPr lang="en-US"/>
           </a:p>
@@ -2847,7 +2847,7 @@
           <a:p>
             <a:fld id="{27355D62-5D94-8B4F-9374-AA8F8E83C52E}" type="datetimeFigureOut">
               <a:rPr lang="en-US" smtClean="0"/>
-              <a:t>5/18/14</a:t>
+              <a:t>5/19/14</a:t>
             </a:fld>
             <a:endParaRPr lang="en-US"/>
           </a:p>
@@ -3124,7 +3124,7 @@
           <a:p>
             <a:fld id="{27355D62-5D94-8B4F-9374-AA8F8E83C52E}" type="datetimeFigureOut">
               <a:rPr lang="en-US" smtClean="0"/>
-              <a:t>5/18/14</a:t>
+              <a:t>5/19/14</a:t>
             </a:fld>
             <a:endParaRPr lang="en-US"/>
           </a:p>
@@ -3377,7 +3377,7 @@
           <a:p>
             <a:fld id="{27355D62-5D94-8B4F-9374-AA8F8E83C52E}" type="datetimeFigureOut">
               <a:rPr lang="en-US" smtClean="0"/>
-              <a:t>5/18/14</a:t>
+              <a:t>5/19/14</a:t>
             </a:fld>
             <a:endParaRPr lang="en-US"/>
           </a:p>
@@ -3590,7 +3590,7 @@
           <a:p>
             <a:fld id="{27355D62-5D94-8B4F-9374-AA8F8E83C52E}" type="datetimeFigureOut">
               <a:rPr lang="en-US" smtClean="0"/>
-              <a:t>5/18/14</a:t>
+              <a:t>5/19/14</a:t>
             </a:fld>
             <a:endParaRPr lang="en-US"/>
           </a:p>
@@ -5468,16 +5468,16 @@
               <a:t>p</a:t>
             </a:r>
             <a:r>
-              <a:rPr lang="en-US" sz="2400" dirty="0" smtClean="0"/>
+              <a:rPr lang="en-US" sz="2400" smtClean="0"/>
               <a:t>*</a:t>
             </a:r>
             <a:r>
-              <a:rPr lang="en-US" dirty="0" smtClean="0">
+              <a:rPr lang="en-US" smtClean="0">
                 <a:solidFill>
                   <a:srgbClr val="000090"/>
                 </a:solidFill>
               </a:rPr>
-              <a:t>q  100 = 2*2*5*5</a:t>
+              <a:t>q</a:t>
             </a:r>
             <a:endParaRPr lang="en-US" dirty="0" smtClean="0">
               <a:solidFill>
@@ -5567,7 +5567,17 @@
                   </a:schemeClr>
                 </a:solidFill>
               </a:rPr>
-              <a:t>Pick e such that:</a:t>
+              <a:t>Pick </a:t>
+            </a:r>
+            <a:r>
+              <a:rPr lang="en-US" dirty="0" smtClean="0">
+                <a:solidFill>
+                  <a:schemeClr val="bg1">
+                    <a:lumMod val="65000"/>
+                  </a:schemeClr>
+                </a:solidFill>
+              </a:rPr>
+              <a:t>e such that:</a:t>
             </a:r>
             <a:r>
               <a:rPr lang="en-US" dirty="0" smtClean="0"/>
@@ -11896,11 +11906,6 @@
               </a:rPr>
               <a:t>Problem: How can the server know who sent the message?</a:t>
             </a:r>
-            <a:endParaRPr lang="en-US" sz="2800" dirty="0" smtClean="0">
-              <a:solidFill>
-                <a:srgbClr val="FF0000"/>
-              </a:solidFill>
-            </a:endParaRPr>
           </a:p>
         </p:txBody>
       </p:sp>
@@ -12298,7 +12303,6 @@
               <a:rPr lang="en-US" sz="2800" dirty="0" smtClean="0"/>
               <a:t>Encrypt hash with your private key</a:t>
             </a:r>
-            <a:endParaRPr lang="en-US" sz="2800" dirty="0" smtClean="0"/>
           </a:p>
           <a:p>
             <a:pPr marL="514350" indent="-514350">
@@ -12551,15 +12555,7 @@
           <a:p>
             <a:r>
               <a:rPr lang="en-US" sz="2800" dirty="0" smtClean="0"/>
-              <a:t>Cryptographic </a:t>
-            </a:r>
-            <a:r>
-              <a:rPr lang="en-US" sz="2800" dirty="0" smtClean="0"/>
-              <a:t>hash </a:t>
-            </a:r>
-            <a:r>
-              <a:rPr lang="en-US" sz="2800" dirty="0" smtClean="0"/>
-              <a:t>function</a:t>
+              <a:t>Cryptographic hash function</a:t>
             </a:r>
             <a:br>
               <a:rPr lang="en-US" sz="2800" dirty="0" smtClean="0"/>
@@ -12610,15 +12606,7 @@
           <a:p>
             <a:r>
               <a:rPr lang="en-US" sz="2800" dirty="0" smtClean="0"/>
-              <a:t>Symmetric (or </a:t>
-            </a:r>
-            <a:r>
-              <a:rPr lang="en-US" sz="2800" dirty="0" smtClean="0"/>
-              <a:t>conventional) </a:t>
-            </a:r>
-            <a:r>
-              <a:rPr lang="en-US" sz="2800" dirty="0" smtClean="0"/>
-              <a:t>cryptography</a:t>
+              <a:t>Symmetric (or conventional) cryptography</a:t>
             </a:r>
             <a:br>
               <a:rPr lang="en-US" sz="2800" dirty="0" smtClean="0"/>
@@ -12649,15 +12637,7 @@
                   <a:srgbClr val="A6A6A6"/>
                 </a:solidFill>
               </a:rPr>
-              <a:t>two keys: each key decrypts the what the other </a:t>
-            </a:r>
-            <a:r>
-              <a:rPr lang="en-US" sz="2800" dirty="0" smtClean="0">
-                <a:solidFill>
-                  <a:srgbClr val="A6A6A6"/>
-                </a:solidFill>
-              </a:rPr>
-              <a:t>encrypts</a:t>
+              <a:t>two keys: each key decrypts the what the other encrypts</a:t>
             </a:r>
           </a:p>
           <a:p>
@@ -12683,11 +12663,6 @@
               </a:rPr>
               <a:t>hash of a message encrypted with a private key</a:t>
             </a:r>
-            <a:endParaRPr lang="en-US" sz="2800" dirty="0" smtClean="0">
-              <a:solidFill>
-                <a:srgbClr val="A6A6A6"/>
-              </a:solidFill>
-            </a:endParaRPr>
           </a:p>
           <a:p>
             <a:endParaRPr lang="en-US" sz="2800" dirty="0">
@@ -13885,13 +13860,6 @@
               </a:rPr>
               <a:t>BODY</a:t>
             </a:r>
-            <a:endParaRPr lang="en-US" sz="1200" i="1" dirty="0" smtClean="0">
-              <a:solidFill>
-                <a:srgbClr val="FF0000"/>
-              </a:solidFill>
-              <a:latin typeface="Monaco"/>
-              <a:cs typeface="Monaco"/>
-            </a:endParaRPr>
           </a:p>
           <a:p>
             <a:endParaRPr lang="en-US" sz="1200" i="1" dirty="0">
@@ -14956,11 +14924,7 @@
             </a:br>
             <a:r>
               <a:rPr lang="en-US" sz="3200" dirty="0" smtClean="0"/>
-              <a:t>Cryptographic </a:t>
-            </a:r>
-            <a:r>
-              <a:rPr lang="en-US" sz="3200" dirty="0" smtClean="0"/>
-              <a:t>Break</a:t>
+              <a:t>Cryptographic Break</a:t>
             </a:r>
             <a:endParaRPr lang="en-US" sz="3200" dirty="0"/>
           </a:p>
@@ -16405,11 +16369,7 @@
             </a:br>
             <a:r>
               <a:rPr lang="en-US" sz="3200" dirty="0" smtClean="0"/>
-              <a:t>Cryptographic </a:t>
-            </a:r>
-            <a:r>
-              <a:rPr lang="en-US" sz="3200" dirty="0" smtClean="0"/>
-              <a:t>Hash Function</a:t>
+              <a:t>Cryptographic Hash Function</a:t>
             </a:r>
             <a:endParaRPr lang="en-US" sz="3200" dirty="0"/>
           </a:p>
@@ -18166,11 +18126,6 @@
               </a:rPr>
               <a:t>Problem: How to share the key?</a:t>
             </a:r>
-            <a:endParaRPr lang="en-US" sz="2800" dirty="0" smtClean="0">
-              <a:solidFill>
-                <a:srgbClr val="FF0000"/>
-              </a:solidFill>
-            </a:endParaRPr>
           </a:p>
         </p:txBody>
       </p:sp>
@@ -20399,11 +20354,7 @@
             </a:pPr>
             <a:r>
               <a:rPr lang="en-US" dirty="0" smtClean="0"/>
-              <a:t>Represent </a:t>
-            </a:r>
-            <a:r>
-              <a:rPr lang="en-US" dirty="0" smtClean="0"/>
-              <a:t>message as a series of integers between 0 and n – 1</a:t>
+              <a:t>Represent message as a series of integers between 0 and n – 1</a:t>
             </a:r>
           </a:p>
           <a:p>
@@ -20413,15 +20364,7 @@
             </a:pPr>
             <a:r>
               <a:rPr lang="en-US" dirty="0" smtClean="0"/>
-              <a:t>Encrypt each </a:t>
-            </a:r>
-            <a:r>
-              <a:rPr lang="en-US" dirty="0" smtClean="0"/>
-              <a:t>integer, M, </a:t>
-            </a:r>
-            <a:r>
-              <a:rPr lang="en-US" dirty="0" smtClean="0"/>
-              <a:t>using:</a:t>
+              <a:t>Encrypt each integer, M, using:</a:t>
             </a:r>
             <a:br>
               <a:rPr lang="en-US" dirty="0" smtClean="0"/>
@@ -20458,11 +20401,7 @@
             </a:pPr>
             <a:r>
               <a:rPr lang="en-US" dirty="0" smtClean="0"/>
-              <a:t>Decrypt </a:t>
-            </a:r>
-            <a:r>
-              <a:rPr lang="en-US" dirty="0" smtClean="0"/>
-              <a:t>each integer using:</a:t>
+              <a:t>Decrypt each integer using:</a:t>
             </a:r>
             <a:br>
               <a:rPr lang="en-US" dirty="0" smtClean="0"/>

</xml_diff>